<commit_message>
updated the notebook for lecture
</commit_message>
<xml_diff>
--- a/files/mysql-in-action-presentation.pptx
+++ b/files/mysql-in-action-presentation.pptx
@@ -5,7 +5,7 @@
     <p:sldMasterId id="2147483648" r:id="rId1"/>
   </p:sldMasterIdLst>
   <p:notesMasterIdLst>
-    <p:notesMasterId r:id="rId12"/>
+    <p:notesMasterId r:id="rId10"/>
   </p:notesMasterIdLst>
   <p:sldIdLst>
     <p:sldId id="256" r:id="rId2"/>
@@ -16,8 +16,6 @@
     <p:sldId id="261" r:id="rId7"/>
     <p:sldId id="264" r:id="rId8"/>
     <p:sldId id="267" r:id="rId9"/>
-    <p:sldId id="266" r:id="rId10"/>
-    <p:sldId id="268" r:id="rId11"/>
   </p:sldIdLst>
   <p:sldSz cx="12192000" cy="6858000"/>
   <p:notesSz cx="6858000" cy="9144000"/>
@@ -129,8 +127,6 @@
             <p14:sldId id="261"/>
             <p14:sldId id="264"/>
             <p14:sldId id="267"/>
-            <p14:sldId id="266"/>
-            <p14:sldId id="268"/>
           </p14:sldIdLst>
         </p14:section>
       </p14:sectionLst>
@@ -903,174 +899,6 @@
     <p:extLst>
       <p:ext uri="{BB962C8B-B14F-4D97-AF65-F5344CB8AC3E}">
         <p14:creationId xmlns:p14="http://schemas.microsoft.com/office/powerpoint/2010/main" val="238975055"/>
-      </p:ext>
-    </p:extLst>
-  </p:cSld>
-  <p:clrMapOvr>
-    <a:masterClrMapping/>
-  </p:clrMapOvr>
-</p:notes>
-</file>
-
-<file path=ppt/notesSlides/notesSlide6.xml><?xml version="1.0" encoding="utf-8"?>
-<p:notes xmlns:a="http://schemas.openxmlformats.org/drawingml/2006/main" xmlns:r="http://schemas.openxmlformats.org/officeDocument/2006/relationships" xmlns:p="http://schemas.openxmlformats.org/presentationml/2006/main">
-  <p:cSld>
-    <p:spTree>
-      <p:nvGrpSpPr>
-        <p:cNvPr id="1" name=""/>
-        <p:cNvGrpSpPr/>
-        <p:nvPr/>
-      </p:nvGrpSpPr>
-      <p:grpSpPr>
-        <a:xfrm>
-          <a:off x="0" y="0"/>
-          <a:ext cx="0" cy="0"/>
-          <a:chOff x="0" y="0"/>
-          <a:chExt cx="0" cy="0"/>
-        </a:xfrm>
-      </p:grpSpPr>
-      <p:sp>
-        <p:nvSpPr>
-          <p:cNvPr id="2" name="Slide Image Placeholder 1"/>
-          <p:cNvSpPr>
-            <a:spLocks noGrp="1" noRot="1" noChangeAspect="1"/>
-          </p:cNvSpPr>
-          <p:nvPr>
-            <p:ph type="sldImg"/>
-          </p:nvPr>
-        </p:nvSpPr>
-        <p:spPr/>
-      </p:sp>
-      <p:sp>
-        <p:nvSpPr>
-          <p:cNvPr id="3" name="Notes Placeholder 2"/>
-          <p:cNvSpPr>
-            <a:spLocks noGrp="1"/>
-          </p:cNvSpPr>
-          <p:nvPr>
-            <p:ph type="body" idx="1"/>
-          </p:nvPr>
-        </p:nvSpPr>
-        <p:spPr/>
-        <p:txBody>
-          <a:bodyPr/>
-          <a:lstStyle/>
-          <a:p>
-            <a:endParaRPr lang="en-US" dirty="0"/>
-          </a:p>
-        </p:txBody>
-      </p:sp>
-      <p:sp>
-        <p:nvSpPr>
-          <p:cNvPr id="4" name="Slide Number Placeholder 3"/>
-          <p:cNvSpPr>
-            <a:spLocks noGrp="1"/>
-          </p:cNvSpPr>
-          <p:nvPr>
-            <p:ph type="sldNum" sz="quarter" idx="10"/>
-          </p:nvPr>
-        </p:nvSpPr>
-        <p:spPr/>
-        <p:txBody>
-          <a:bodyPr/>
-          <a:lstStyle/>
-          <a:p>
-            <a:fld id="{25D4F7A7-9899-014B-AF56-CC849F8BA479}" type="slidenum">
-              <a:rPr lang="en-US" smtClean="0"/>
-              <a:t>9</a:t>
-            </a:fld>
-            <a:endParaRPr lang="en-US"/>
-          </a:p>
-        </p:txBody>
-      </p:sp>
-    </p:spTree>
-    <p:extLst>
-      <p:ext uri="{BB962C8B-B14F-4D97-AF65-F5344CB8AC3E}">
-        <p14:creationId xmlns:p14="http://schemas.microsoft.com/office/powerpoint/2010/main" val="298085244"/>
-      </p:ext>
-    </p:extLst>
-  </p:cSld>
-  <p:clrMapOvr>
-    <a:masterClrMapping/>
-  </p:clrMapOvr>
-</p:notes>
-</file>
-
-<file path=ppt/notesSlides/notesSlide7.xml><?xml version="1.0" encoding="utf-8"?>
-<p:notes xmlns:a="http://schemas.openxmlformats.org/drawingml/2006/main" xmlns:r="http://schemas.openxmlformats.org/officeDocument/2006/relationships" xmlns:p="http://schemas.openxmlformats.org/presentationml/2006/main">
-  <p:cSld>
-    <p:spTree>
-      <p:nvGrpSpPr>
-        <p:cNvPr id="1" name=""/>
-        <p:cNvGrpSpPr/>
-        <p:nvPr/>
-      </p:nvGrpSpPr>
-      <p:grpSpPr>
-        <a:xfrm>
-          <a:off x="0" y="0"/>
-          <a:ext cx="0" cy="0"/>
-          <a:chOff x="0" y="0"/>
-          <a:chExt cx="0" cy="0"/>
-        </a:xfrm>
-      </p:grpSpPr>
-      <p:sp>
-        <p:nvSpPr>
-          <p:cNvPr id="2" name="Slide Image Placeholder 1"/>
-          <p:cNvSpPr>
-            <a:spLocks noGrp="1" noRot="1" noChangeAspect="1"/>
-          </p:cNvSpPr>
-          <p:nvPr>
-            <p:ph type="sldImg"/>
-          </p:nvPr>
-        </p:nvSpPr>
-        <p:spPr/>
-      </p:sp>
-      <p:sp>
-        <p:nvSpPr>
-          <p:cNvPr id="3" name="Notes Placeholder 2"/>
-          <p:cNvSpPr>
-            <a:spLocks noGrp="1"/>
-          </p:cNvSpPr>
-          <p:nvPr>
-            <p:ph type="body" idx="1"/>
-          </p:nvPr>
-        </p:nvSpPr>
-        <p:spPr/>
-        <p:txBody>
-          <a:bodyPr/>
-          <a:lstStyle/>
-          <a:p>
-            <a:endParaRPr lang="en-US" dirty="0"/>
-          </a:p>
-        </p:txBody>
-      </p:sp>
-      <p:sp>
-        <p:nvSpPr>
-          <p:cNvPr id="4" name="Slide Number Placeholder 3"/>
-          <p:cNvSpPr>
-            <a:spLocks noGrp="1"/>
-          </p:cNvSpPr>
-          <p:nvPr>
-            <p:ph type="sldNum" sz="quarter" idx="10"/>
-          </p:nvPr>
-        </p:nvSpPr>
-        <p:spPr/>
-        <p:txBody>
-          <a:bodyPr/>
-          <a:lstStyle/>
-          <a:p>
-            <a:fld id="{25D4F7A7-9899-014B-AF56-CC849F8BA479}" type="slidenum">
-              <a:rPr lang="en-US" smtClean="0"/>
-              <a:t>10</a:t>
-            </a:fld>
-            <a:endParaRPr lang="en-US"/>
-          </a:p>
-        </p:txBody>
-      </p:sp>
-    </p:spTree>
-    <p:extLst>
-      <p:ext uri="{BB962C8B-B14F-4D97-AF65-F5344CB8AC3E}">
-        <p14:creationId xmlns:p14="http://schemas.microsoft.com/office/powerpoint/2010/main" val="1731544179"/>
       </p:ext>
     </p:extLst>
   </p:cSld>
@@ -4080,189 +3908,6 @@
 </p:sld>
 </file>
 
-<file path=ppt/slides/slide10.xml><?xml version="1.0" encoding="utf-8"?>
-<p:sld xmlns:a="http://schemas.openxmlformats.org/drawingml/2006/main" xmlns:r="http://schemas.openxmlformats.org/officeDocument/2006/relationships" xmlns:p="http://schemas.openxmlformats.org/presentationml/2006/main">
-  <p:cSld>
-    <p:bg>
-      <p:bgPr>
-        <a:gradFill>
-          <a:gsLst>
-            <a:gs pos="53000">
-              <a:schemeClr val="accent6">
-                <a:lumMod val="99000"/>
-                <a:lumOff val="1000"/>
-              </a:schemeClr>
-            </a:gs>
-            <a:gs pos="0">
-              <a:schemeClr val="accent6">
-                <a:lumMod val="75000"/>
-              </a:schemeClr>
-            </a:gs>
-            <a:gs pos="100000">
-              <a:schemeClr val="accent6">
-                <a:lumMod val="75000"/>
-              </a:schemeClr>
-            </a:gs>
-          </a:gsLst>
-          <a:path path="circle">
-            <a:fillToRect l="50000" t="50000" r="50000" b="50000"/>
-          </a:path>
-        </a:gradFill>
-        <a:effectLst/>
-      </p:bgPr>
-    </p:bg>
-    <p:spTree>
-      <p:nvGrpSpPr>
-        <p:cNvPr id="1" name=""/>
-        <p:cNvGrpSpPr/>
-        <p:nvPr/>
-      </p:nvGrpSpPr>
-      <p:grpSpPr>
-        <a:xfrm>
-          <a:off x="0" y="0"/>
-          <a:ext cx="0" cy="0"/>
-          <a:chOff x="0" y="0"/>
-          <a:chExt cx="0" cy="0"/>
-        </a:xfrm>
-      </p:grpSpPr>
-      <p:pic>
-        <p:nvPicPr>
-          <p:cNvPr id="3" name="Picture 2"/>
-          <p:cNvPicPr>
-            <a:picLocks noChangeAspect="1"/>
-          </p:cNvPicPr>
-          <p:nvPr/>
-        </p:nvPicPr>
-        <p:blipFill>
-          <a:blip r:embed="rId3">
-            <a:extLst>
-              <a:ext uri="{28A0092B-C50C-407E-A947-70E740481C1C}">
-                <a14:useLocalDpi xmlns:a14="http://schemas.microsoft.com/office/drawing/2010/main" val="0"/>
-              </a:ext>
-            </a:extLst>
-          </a:blip>
-          <a:stretch>
-            <a:fillRect/>
-          </a:stretch>
-        </p:blipFill>
-        <p:spPr>
-          <a:xfrm>
-            <a:off x="10705752" y="160867"/>
-            <a:ext cx="1294688" cy="668867"/>
-          </a:xfrm>
-          <a:prstGeom prst="rect">
-            <a:avLst/>
-          </a:prstGeom>
-        </p:spPr>
-      </p:pic>
-      <p:sp>
-        <p:nvSpPr>
-          <p:cNvPr id="4" name="TextBox 3"/>
-          <p:cNvSpPr txBox="1"/>
-          <p:nvPr/>
-        </p:nvSpPr>
-        <p:spPr>
-          <a:xfrm>
-            <a:off x="207304" y="160867"/>
-            <a:ext cx="4374659" cy="830997"/>
-          </a:xfrm>
-          <a:prstGeom prst="rect">
-            <a:avLst/>
-          </a:prstGeom>
-          <a:noFill/>
-        </p:spPr>
-        <p:txBody>
-          <a:bodyPr wrap="none" rtlCol="0">
-            <a:spAutoFit/>
-          </a:bodyPr>
-          <a:lstStyle/>
-          <a:p>
-            <a:r>
-              <a:rPr lang="en-PH" sz="4800" b="1" dirty="0" smtClean="0">
-                <a:solidFill>
-                  <a:schemeClr val="bg1"/>
-                </a:solidFill>
-              </a:rPr>
-              <a:t>Create Database</a:t>
-            </a:r>
-            <a:endParaRPr lang="en-PH" sz="4800" b="1" dirty="0">
-              <a:solidFill>
-                <a:schemeClr val="bg1"/>
-              </a:solidFill>
-            </a:endParaRPr>
-          </a:p>
-        </p:txBody>
-      </p:sp>
-      <p:sp>
-        <p:nvSpPr>
-          <p:cNvPr id="5" name="TextBox 4"/>
-          <p:cNvSpPr txBox="1"/>
-          <p:nvPr/>
-        </p:nvSpPr>
-        <p:spPr>
-          <a:xfrm>
-            <a:off x="571855" y="1329268"/>
-            <a:ext cx="10781241" cy="584775"/>
-          </a:xfrm>
-          <a:prstGeom prst="rect">
-            <a:avLst/>
-          </a:prstGeom>
-          <a:noFill/>
-        </p:spPr>
-        <p:txBody>
-          <a:bodyPr wrap="square" rtlCol="0">
-            <a:spAutoFit/>
-          </a:bodyPr>
-          <a:lstStyle/>
-          <a:p>
-            <a:pPr marL="457200" indent="-457200">
-              <a:buFont typeface="Wingdings" charset="2"/>
-              <a:buChar char="v"/>
-            </a:pPr>
-            <a:r>
-              <a:rPr lang="en-US" sz="3200" dirty="0" smtClean="0">
-                <a:solidFill>
-                  <a:schemeClr val="bg1"/>
-                </a:solidFill>
-              </a:rPr>
-              <a:t>Syntax</a:t>
-            </a:r>
-            <a:endParaRPr lang="en-US" sz="3200" dirty="0">
-              <a:solidFill>
-                <a:schemeClr val="bg1"/>
-              </a:solidFill>
-            </a:endParaRPr>
-          </a:p>
-        </p:txBody>
-      </p:sp>
-    </p:spTree>
-    <p:extLst>
-      <p:ext uri="{BB962C8B-B14F-4D97-AF65-F5344CB8AC3E}">
-        <p14:creationId xmlns:p14="http://schemas.microsoft.com/office/powerpoint/2010/main" val="266510082"/>
-      </p:ext>
-    </p:extLst>
-  </p:cSld>
-  <p:clrMapOvr>
-    <a:masterClrMapping/>
-  </p:clrMapOvr>
-  <mc:AlternateContent xmlns:mc="http://schemas.openxmlformats.org/markup-compatibility/2006" xmlns:p14="http://schemas.microsoft.com/office/powerpoint/2010/main">
-    <mc:Choice Requires="p14">
-      <p:transition spd="slow" p14:dur="2000"/>
-    </mc:Choice>
-    <mc:Fallback xmlns="">
-      <p:transition spd="slow"/>
-    </mc:Fallback>
-  </mc:AlternateContent>
-  <p:timing>
-    <p:tnLst>
-      <p:par>
-        <p:cTn id="1" dur="indefinite" restart="never" nodeType="tmRoot"/>
-      </p:par>
-    </p:tnLst>
-  </p:timing>
-</p:sld>
-</file>
-
 <file path=ppt/slides/slide2.xml><?xml version="1.0" encoding="utf-8"?>
 <p:sld xmlns:a="http://schemas.openxmlformats.org/drawingml/2006/main" xmlns:r="http://schemas.openxmlformats.org/officeDocument/2006/relationships" xmlns:p="http://schemas.openxmlformats.org/presentationml/2006/main">
   <p:cSld>
@@ -4889,11 +4534,6 @@
               </a:rPr>
               <a:t>-in-action</a:t>
             </a:r>
-            <a:endParaRPr lang="en-PH" sz="3600" b="1" dirty="0">
-              <a:solidFill>
-                <a:schemeClr val="bg1"/>
-              </a:solidFill>
-            </a:endParaRPr>
           </a:p>
         </p:txBody>
       </p:sp>
@@ -5160,13 +4800,6 @@
               </a:rPr>
               <a:t>/download/</a:t>
             </a:r>
-            <a:endParaRPr lang="en-US" sz="2000" u="sng" dirty="0">
-              <a:solidFill>
-                <a:schemeClr val="accent1">
-                  <a:lumMod val="50000"/>
-                </a:schemeClr>
-              </a:solidFill>
-            </a:endParaRPr>
           </a:p>
         </p:txBody>
       </p:sp>
@@ -6003,264 +5636,6 @@
     <p:extLst>
       <p:ext uri="{BB962C8B-B14F-4D97-AF65-F5344CB8AC3E}">
         <p14:creationId xmlns:p14="http://schemas.microsoft.com/office/powerpoint/2010/main" val="147081136"/>
-      </p:ext>
-    </p:extLst>
-  </p:cSld>
-  <p:clrMapOvr>
-    <a:masterClrMapping/>
-  </p:clrMapOvr>
-  <mc:AlternateContent xmlns:mc="http://schemas.openxmlformats.org/markup-compatibility/2006" xmlns:p14="http://schemas.microsoft.com/office/powerpoint/2010/main">
-    <mc:Choice Requires="p14">
-      <p:transition spd="slow" p14:dur="2000"/>
-    </mc:Choice>
-    <mc:Fallback xmlns="">
-      <p:transition spd="slow"/>
-    </mc:Fallback>
-  </mc:AlternateContent>
-  <p:timing>
-    <p:tnLst>
-      <p:par>
-        <p:cTn id="1" dur="indefinite" restart="never" nodeType="tmRoot"/>
-      </p:par>
-    </p:tnLst>
-  </p:timing>
-</p:sld>
-</file>
-
-<file path=ppt/slides/slide9.xml><?xml version="1.0" encoding="utf-8"?>
-<p:sld xmlns:a="http://schemas.openxmlformats.org/drawingml/2006/main" xmlns:r="http://schemas.openxmlformats.org/officeDocument/2006/relationships" xmlns:p="http://schemas.openxmlformats.org/presentationml/2006/main">
-  <p:cSld>
-    <p:bg>
-      <p:bgPr>
-        <a:gradFill>
-          <a:gsLst>
-            <a:gs pos="53000">
-              <a:schemeClr val="accent6">
-                <a:lumMod val="99000"/>
-                <a:lumOff val="1000"/>
-              </a:schemeClr>
-            </a:gs>
-            <a:gs pos="0">
-              <a:schemeClr val="accent6">
-                <a:lumMod val="75000"/>
-              </a:schemeClr>
-            </a:gs>
-            <a:gs pos="100000">
-              <a:schemeClr val="accent6">
-                <a:lumMod val="75000"/>
-              </a:schemeClr>
-            </a:gs>
-          </a:gsLst>
-          <a:path path="circle">
-            <a:fillToRect l="50000" t="50000" r="50000" b="50000"/>
-          </a:path>
-        </a:gradFill>
-        <a:effectLst/>
-      </p:bgPr>
-    </p:bg>
-    <p:spTree>
-      <p:nvGrpSpPr>
-        <p:cNvPr id="1" name=""/>
-        <p:cNvGrpSpPr/>
-        <p:nvPr/>
-      </p:nvGrpSpPr>
-      <p:grpSpPr>
-        <a:xfrm>
-          <a:off x="0" y="0"/>
-          <a:ext cx="0" cy="0"/>
-          <a:chOff x="0" y="0"/>
-          <a:chExt cx="0" cy="0"/>
-        </a:xfrm>
-      </p:grpSpPr>
-      <p:pic>
-        <p:nvPicPr>
-          <p:cNvPr id="3" name="Picture 2"/>
-          <p:cNvPicPr>
-            <a:picLocks noChangeAspect="1"/>
-          </p:cNvPicPr>
-          <p:nvPr/>
-        </p:nvPicPr>
-        <p:blipFill>
-          <a:blip r:embed="rId3">
-            <a:extLst>
-              <a:ext uri="{28A0092B-C50C-407E-A947-70E740481C1C}">
-                <a14:useLocalDpi xmlns:a14="http://schemas.microsoft.com/office/drawing/2010/main" val="0"/>
-              </a:ext>
-            </a:extLst>
-          </a:blip>
-          <a:stretch>
-            <a:fillRect/>
-          </a:stretch>
-        </p:blipFill>
-        <p:spPr>
-          <a:xfrm>
-            <a:off x="10705752" y="160867"/>
-            <a:ext cx="1294688" cy="668867"/>
-          </a:xfrm>
-          <a:prstGeom prst="rect">
-            <a:avLst/>
-          </a:prstGeom>
-        </p:spPr>
-      </p:pic>
-      <p:sp>
-        <p:nvSpPr>
-          <p:cNvPr id="4" name="TextBox 3"/>
-          <p:cNvSpPr txBox="1"/>
-          <p:nvPr/>
-        </p:nvSpPr>
-        <p:spPr>
-          <a:xfrm>
-            <a:off x="207304" y="160867"/>
-            <a:ext cx="6576031" cy="830997"/>
-          </a:xfrm>
-          <a:prstGeom prst="rect">
-            <a:avLst/>
-          </a:prstGeom>
-          <a:noFill/>
-        </p:spPr>
-        <p:txBody>
-          <a:bodyPr wrap="none" rtlCol="0">
-            <a:spAutoFit/>
-          </a:bodyPr>
-          <a:lstStyle/>
-          <a:p>
-            <a:r>
-              <a:rPr lang="en-PH" sz="4800" b="1" dirty="0" smtClean="0">
-                <a:solidFill>
-                  <a:schemeClr val="bg1"/>
-                </a:solidFill>
-              </a:rPr>
-              <a:t>Database (</a:t>
-            </a:r>
-            <a:r>
-              <a:rPr lang="en-PH" sz="4800" b="1" dirty="0" err="1" smtClean="0">
-                <a:solidFill>
-                  <a:schemeClr val="bg1"/>
-                </a:solidFill>
-              </a:rPr>
-              <a:t>classicmodels</a:t>
-            </a:r>
-            <a:r>
-              <a:rPr lang="en-PH" sz="4800" b="1" dirty="0" smtClean="0">
-                <a:solidFill>
-                  <a:schemeClr val="bg1"/>
-                </a:solidFill>
-              </a:rPr>
-              <a:t>)</a:t>
-            </a:r>
-            <a:endParaRPr lang="en-PH" sz="4800" b="1" dirty="0">
-              <a:solidFill>
-                <a:schemeClr val="bg1"/>
-              </a:solidFill>
-            </a:endParaRPr>
-          </a:p>
-        </p:txBody>
-      </p:sp>
-      <p:sp>
-        <p:nvSpPr>
-          <p:cNvPr id="5" name="TextBox 4"/>
-          <p:cNvSpPr txBox="1"/>
-          <p:nvPr/>
-        </p:nvSpPr>
-        <p:spPr>
-          <a:xfrm>
-            <a:off x="440266" y="1397001"/>
-            <a:ext cx="10781241" cy="1569660"/>
-          </a:xfrm>
-          <a:prstGeom prst="rect">
-            <a:avLst/>
-          </a:prstGeom>
-          <a:noFill/>
-        </p:spPr>
-        <p:txBody>
-          <a:bodyPr wrap="square" rtlCol="0">
-            <a:spAutoFit/>
-          </a:bodyPr>
-          <a:lstStyle/>
-          <a:p>
-            <a:pPr marL="457200" indent="-457200">
-              <a:buFont typeface="Wingdings" charset="2"/>
-              <a:buChar char="v"/>
-            </a:pPr>
-            <a:r>
-              <a:rPr lang="en-US" sz="3200" dirty="0" smtClean="0">
-                <a:solidFill>
-                  <a:schemeClr val="bg1"/>
-                </a:solidFill>
-              </a:rPr>
-              <a:t>Extract the </a:t>
-            </a:r>
-            <a:r>
-              <a:rPr lang="en-US" sz="3200" dirty="0" err="1" smtClean="0">
-                <a:solidFill>
-                  <a:schemeClr val="bg1"/>
-                </a:solidFill>
-              </a:rPr>
-              <a:t>mysqlsampledatabase.zip</a:t>
-            </a:r>
-            <a:endParaRPr lang="en-US" sz="3200" dirty="0" smtClean="0">
-              <a:solidFill>
-                <a:schemeClr val="bg1"/>
-              </a:solidFill>
-            </a:endParaRPr>
-          </a:p>
-          <a:p>
-            <a:pPr marL="457200" indent="-457200">
-              <a:buFont typeface="Wingdings" charset="2"/>
-              <a:buChar char="v"/>
-            </a:pPr>
-            <a:r>
-              <a:rPr lang="en-US" sz="3200" dirty="0">
-                <a:solidFill>
-                  <a:schemeClr val="bg1"/>
-                </a:solidFill>
-              </a:rPr>
-              <a:t>Execute the SQL Script (</a:t>
-            </a:r>
-            <a:r>
-              <a:rPr lang="en-US" sz="3200" dirty="0" err="1" smtClean="0">
-                <a:solidFill>
-                  <a:schemeClr val="bg1"/>
-                </a:solidFill>
-              </a:rPr>
-              <a:t>mysqlsampledatabase.sql</a:t>
-            </a:r>
-            <a:r>
-              <a:rPr lang="en-US" sz="3200" dirty="0" smtClean="0">
-                <a:solidFill>
-                  <a:schemeClr val="bg1"/>
-                </a:solidFill>
-              </a:rPr>
-              <a:t>) using </a:t>
-            </a:r>
-            <a:r>
-              <a:rPr lang="en-US" sz="3200" dirty="0" err="1" smtClean="0">
-                <a:solidFill>
-                  <a:schemeClr val="bg1"/>
-                </a:solidFill>
-              </a:rPr>
-              <a:t>DBeaver</a:t>
-            </a:r>
-            <a:r>
-              <a:rPr lang="en-US" sz="3200" dirty="0" smtClean="0">
-                <a:solidFill>
-                  <a:schemeClr val="bg1"/>
-                </a:solidFill>
-              </a:rPr>
-              <a:t>.</a:t>
-            </a:r>
-            <a:endParaRPr lang="en-US" sz="3200" dirty="0">
-              <a:solidFill>
-                <a:schemeClr val="bg1"/>
-              </a:solidFill>
-            </a:endParaRPr>
-          </a:p>
-        </p:txBody>
-      </p:sp>
-    </p:spTree>
-    <p:extLst>
-      <p:ext uri="{BB962C8B-B14F-4D97-AF65-F5344CB8AC3E}">
-        <p14:creationId xmlns:p14="http://schemas.microsoft.com/office/powerpoint/2010/main" val="866447593"/>
       </p:ext>
     </p:extLst>
   </p:cSld>

</xml_diff>